<commit_message>
add analysis to README
</commit_message>
<xml_diff>
--- a/Bootcamp _Campstone1_Project.pptx
+++ b/Bootcamp _Campstone1_Project.pptx
@@ -135,7 +135,7 @@
 <file path=ppt/revisionInfo.xml><?xml version="1.0" encoding="utf-8"?>
 <p1510:revInfo xmlns:a="http://schemas.openxmlformats.org/drawingml/2006/main" xmlns:r="http://schemas.openxmlformats.org/officeDocument/2006/relationships" xmlns:p1510="http://schemas.microsoft.com/office/powerpoint/2015/10/main">
   <p1510:revLst>
-    <p1510:client id="{BED68BDC-8325-4F28-B18B-6D18BF1EA9CF}" v="22" dt="2021-08-03T19:30:59.783"/>
+    <p1510:client id="{BED68BDC-8325-4F28-B18B-6D18BF1EA9CF}" v="24" dt="2021-08-03T20:03:32.858"/>
   </p1510:revLst>
 </p1510:revInfo>
 </file>
@@ -145,7 +145,7 @@
   <pc:docChgLst>
     <pc:chgData name="Hutula, Karina" userId="76360105-4658-44a5-a2e4-d25da711b3ec" providerId="ADAL" clId="{BED68BDC-8325-4F28-B18B-6D18BF1EA9CF}"/>
     <pc:docChg chg="undo custSel addSld modSld sldOrd">
-      <pc:chgData name="Hutula, Karina" userId="76360105-4658-44a5-a2e4-d25da711b3ec" providerId="ADAL" clId="{BED68BDC-8325-4F28-B18B-6D18BF1EA9CF}" dt="2021-08-03T19:37:56.651" v="2411"/>
+      <pc:chgData name="Hutula, Karina" userId="76360105-4658-44a5-a2e4-d25da711b3ec" providerId="ADAL" clId="{BED68BDC-8325-4F28-B18B-6D18BF1EA9CF}" dt="2021-08-03T20:06:54.998" v="2438" actId="20577"/>
       <pc:docMkLst>
         <pc:docMk/>
       </pc:docMkLst>
@@ -172,7 +172,7 @@
         </pc:sldMkLst>
       </pc:sldChg>
       <pc:sldChg chg="modNotesTx">
-        <pc:chgData name="Hutula, Karina" userId="76360105-4658-44a5-a2e4-d25da711b3ec" providerId="ADAL" clId="{BED68BDC-8325-4F28-B18B-6D18BF1EA9CF}" dt="2021-08-03T19:32:44.746" v="1890" actId="20577"/>
+        <pc:chgData name="Hutula, Karina" userId="76360105-4658-44a5-a2e4-d25da711b3ec" providerId="ADAL" clId="{BED68BDC-8325-4F28-B18B-6D18BF1EA9CF}" dt="2021-08-03T20:06:54.998" v="2438" actId="20577"/>
         <pc:sldMkLst>
           <pc:docMk/>
           <pc:sldMk cId="995707058" sldId="266"/>
@@ -281,7 +281,7 @@
         </pc:spChg>
       </pc:sldChg>
       <pc:sldChg chg="ord modNotesTx">
-        <pc:chgData name="Hutula, Karina" userId="76360105-4658-44a5-a2e4-d25da711b3ec" providerId="ADAL" clId="{BED68BDC-8325-4F28-B18B-6D18BF1EA9CF}" dt="2021-08-03T18:48:19.301" v="736" actId="20577"/>
+        <pc:chgData name="Hutula, Karina" userId="76360105-4658-44a5-a2e4-d25da711b3ec" providerId="ADAL" clId="{BED68BDC-8325-4F28-B18B-6D18BF1EA9CF}" dt="2021-08-03T20:05:38.459" v="2421" actId="20577"/>
         <pc:sldMkLst>
           <pc:docMk/>
           <pc:sldMk cId="221715228" sldId="274"/>
@@ -295,13 +295,13 @@
         </pc:sldMkLst>
       </pc:sldChg>
       <pc:sldChg chg="modSp mod ord">
-        <pc:chgData name="Hutula, Karina" userId="76360105-4658-44a5-a2e4-d25da711b3ec" providerId="ADAL" clId="{BED68BDC-8325-4F28-B18B-6D18BF1EA9CF}" dt="2021-08-03T19:37:39.451" v="2409"/>
+        <pc:chgData name="Hutula, Karina" userId="76360105-4658-44a5-a2e4-d25da711b3ec" providerId="ADAL" clId="{BED68BDC-8325-4F28-B18B-6D18BF1EA9CF}" dt="2021-08-03T20:03:32.858" v="2415" actId="20578"/>
         <pc:sldMkLst>
           <pc:docMk/>
           <pc:sldMk cId="1311034072" sldId="276"/>
         </pc:sldMkLst>
         <pc:spChg chg="mod">
-          <ac:chgData name="Hutula, Karina" userId="76360105-4658-44a5-a2e4-d25da711b3ec" providerId="ADAL" clId="{BED68BDC-8325-4F28-B18B-6D18BF1EA9CF}" dt="2021-08-03T19:13:48.226" v="1493" actId="27636"/>
+          <ac:chgData name="Hutula, Karina" userId="76360105-4658-44a5-a2e4-d25da711b3ec" providerId="ADAL" clId="{BED68BDC-8325-4F28-B18B-6D18BF1EA9CF}" dt="2021-08-03T20:03:32.858" v="2415" actId="20578"/>
           <ac:spMkLst>
             <pc:docMk/>
             <pc:sldMk cId="1311034072" sldId="276"/>
@@ -1162,11 +1162,140 @@
             </a:pPr>
             <a:r>
               <a:rPr lang="en-US" dirty="0"/>
-              <a:t>Along with our thoughts on punts, we believed we would see less plays for loss over time because of the increase in offensive yards. This chart, however, shows a moderately correlated, increasing trend over time.  Though this trend is contrary to our hypothesis, </a:t>
+              <a:t>Along with our thoughts on punts, we believed we would see less plays for loss over time because of the increase in offensive yards. </a:t>
+            </a:r>
+          </a:p>
+          <a:p>
+            <a:pPr marL="0" marR="0" lvl="0" indent="0" algn="l" defTabSz="914400" rtl="0" eaLnBrk="1" fontAlgn="auto" latinLnBrk="0" hangingPunct="1">
+              <a:lnSpc>
+                <a:spcPct val="100000"/>
+              </a:lnSpc>
+              <a:spcBef>
+                <a:spcPts val="0"/>
+              </a:spcBef>
+              <a:spcAft>
+                <a:spcPts val="0"/>
+              </a:spcAft>
+              <a:buClrTx/>
+              <a:buSzTx/>
+              <a:buFontTx/>
+              <a:buNone/>
+              <a:tabLst/>
+              <a:defRPr/>
+            </a:pPr>
+            <a:endParaRPr lang="en-US" dirty="0"/>
+          </a:p>
+          <a:p>
+            <a:pPr marL="0" marR="0" lvl="0" indent="0" algn="l" defTabSz="914400" rtl="0" eaLnBrk="1" fontAlgn="auto" latinLnBrk="0" hangingPunct="1">
+              <a:lnSpc>
+                <a:spcPct val="100000"/>
+              </a:lnSpc>
+              <a:spcBef>
+                <a:spcPts val="0"/>
+              </a:spcBef>
+              <a:spcAft>
+                <a:spcPts val="0"/>
+              </a:spcAft>
+              <a:buClrTx/>
+              <a:buSzTx/>
+              <a:buFontTx/>
+              <a:buNone/>
+              <a:tabLst/>
+              <a:defRPr/>
+            </a:pPr>
+            <a:r>
+              <a:rPr lang="en-US" dirty="0"/>
+              <a:t>This chart, however, shows a moderately correlated, increasing trend over time.  </a:t>
+            </a:r>
+          </a:p>
+          <a:p>
+            <a:pPr marL="0" marR="0" lvl="0" indent="0" algn="l" defTabSz="914400" rtl="0" eaLnBrk="1" fontAlgn="auto" latinLnBrk="0" hangingPunct="1">
+              <a:lnSpc>
+                <a:spcPct val="100000"/>
+              </a:lnSpc>
+              <a:spcBef>
+                <a:spcPts val="0"/>
+              </a:spcBef>
+              <a:spcAft>
+                <a:spcPts val="0"/>
+              </a:spcAft>
+              <a:buClrTx/>
+              <a:buSzTx/>
+              <a:buFontTx/>
+              <a:buNone/>
+              <a:tabLst/>
+              <a:defRPr/>
+            </a:pPr>
+            <a:endParaRPr lang="en-US" dirty="0"/>
+          </a:p>
+          <a:p>
+            <a:pPr marL="0" marR="0" lvl="0" indent="0" algn="l" defTabSz="914400" rtl="0" eaLnBrk="1" fontAlgn="auto" latinLnBrk="0" hangingPunct="1">
+              <a:lnSpc>
+                <a:spcPct val="100000"/>
+              </a:lnSpc>
+              <a:spcBef>
+                <a:spcPts val="0"/>
+              </a:spcBef>
+              <a:spcAft>
+                <a:spcPts val="0"/>
+              </a:spcAft>
+              <a:buClrTx/>
+              <a:buSzTx/>
+              <a:buFontTx/>
+              <a:buNone/>
+              <a:tabLst/>
+              <a:defRPr/>
+            </a:pPr>
+            <a:r>
+              <a:rPr lang="en-US" dirty="0"/>
+              <a:t>Though this trend is contrary to our hypothesis, </a:t>
             </a:r>
             <a:r>
               <a:rPr lang="en-US" baseline="0" dirty="0"/>
-              <a:t>plays for loss could be a result of more possessions by the offense or an increase game speed, which leads to more plays overall. Further analysis would be needed to investigate if the pace of play is changing and how it may be impacting the game.</a:t>
+              <a:t>plays for loss could be a result of more possessions by the offense or an increase game speed, which leads to more plays overall. </a:t>
+            </a:r>
+          </a:p>
+          <a:p>
+            <a:pPr marL="0" marR="0" lvl="0" indent="0" algn="l" defTabSz="914400" rtl="0" eaLnBrk="1" fontAlgn="auto" latinLnBrk="0" hangingPunct="1">
+              <a:lnSpc>
+                <a:spcPct val="100000"/>
+              </a:lnSpc>
+              <a:spcBef>
+                <a:spcPts val="0"/>
+              </a:spcBef>
+              <a:spcAft>
+                <a:spcPts val="0"/>
+              </a:spcAft>
+              <a:buClrTx/>
+              <a:buSzTx/>
+              <a:buFontTx/>
+              <a:buNone/>
+              <a:tabLst/>
+              <a:defRPr/>
+            </a:pPr>
+            <a:endParaRPr lang="en-US" baseline="0" dirty="0"/>
+          </a:p>
+          <a:p>
+            <a:pPr marL="0" marR="0" lvl="0" indent="0" algn="l" defTabSz="914400" rtl="0" eaLnBrk="1" fontAlgn="auto" latinLnBrk="0" hangingPunct="1">
+              <a:lnSpc>
+                <a:spcPct val="100000"/>
+              </a:lnSpc>
+              <a:spcBef>
+                <a:spcPts val="0"/>
+              </a:spcBef>
+              <a:spcAft>
+                <a:spcPts val="0"/>
+              </a:spcAft>
+              <a:buClrTx/>
+              <a:buSzTx/>
+              <a:buFontTx/>
+              <a:buNone/>
+              <a:tabLst/>
+              <a:defRPr/>
+            </a:pPr>
+            <a:r>
+              <a:rPr lang="en-US" baseline="0" dirty="0"/>
+              <a:t>Further analysis would be needed to investigate if the pace of play is changing and how it may be impacting the game.</a:t>
             </a:r>
             <a:endParaRPr lang="en-US" dirty="0"/>
           </a:p>
@@ -1309,7 +1438,7 @@
           <a:p>
             <a:r>
               <a:rPr lang="en-US" dirty="0"/>
-              <a:t>Our expectation was that explosive plays would be increasing over the years, and we’ve been proven correct with a correlation of 0.95.</a:t>
+              <a:t>Our expectation was that explosive plays would be increasing over the years, and we’ve been proven correct with a strong, positive correlation of 0.95.</a:t>
             </a:r>
           </a:p>
         </p:txBody>

</xml_diff>